<commit_message>
update afer lessons - add comments
</commit_message>
<xml_diff>
--- a/Prezentace/PGM_04.pptx
+++ b/Prezentace/PGM_04.pptx
@@ -867,7 +867,7 @@
             <a:fld id="{B61BEF0D-F0BB-DE4B-95CE-6DB70DBA9567}" type="datetimeFigureOut">
               <a:rPr lang="en-US" dirty="0"/>
               <a:pPr/>
-              <a:t>9/20/2020</a:t>
+              <a:t>10/6/2020</a:t>
             </a:fld>
             <a:endParaRPr lang="en-US" dirty="0"/>
           </a:p>
@@ -1115,7 +1115,7 @@
             <a:fld id="{B61BEF0D-F0BB-DE4B-95CE-6DB70DBA9567}" type="datetimeFigureOut">
               <a:rPr lang="en-US" dirty="0"/>
               <a:pPr/>
-              <a:t>9/20/2020</a:t>
+              <a:t>10/6/2020</a:t>
             </a:fld>
             <a:endParaRPr lang="en-US" dirty="0"/>
           </a:p>
@@ -1426,7 +1426,7 @@
             <a:fld id="{B61BEF0D-F0BB-DE4B-95CE-6DB70DBA9567}" type="datetimeFigureOut">
               <a:rPr lang="en-US" dirty="0"/>
               <a:pPr/>
-              <a:t>9/20/2020</a:t>
+              <a:t>10/6/2020</a:t>
             </a:fld>
             <a:endParaRPr lang="en-US" dirty="0"/>
           </a:p>
@@ -1756,7 +1756,7 @@
             <a:fld id="{B61BEF0D-F0BB-DE4B-95CE-6DB70DBA9567}" type="datetimeFigureOut">
               <a:rPr lang="en-US" dirty="0"/>
               <a:pPr/>
-              <a:t>9/20/2020</a:t>
+              <a:t>10/6/2020</a:t>
             </a:fld>
             <a:endParaRPr lang="en-US" dirty="0"/>
           </a:p>
@@ -2067,7 +2067,7 @@
             <a:fld id="{B61BEF0D-F0BB-DE4B-95CE-6DB70DBA9567}" type="datetimeFigureOut">
               <a:rPr lang="en-US" dirty="0"/>
               <a:pPr/>
-              <a:t>9/20/2020</a:t>
+              <a:t>10/6/2020</a:t>
             </a:fld>
             <a:endParaRPr lang="en-US" dirty="0"/>
           </a:p>
@@ -2457,7 +2457,7 @@
             <a:fld id="{B61BEF0D-F0BB-DE4B-95CE-6DB70DBA9567}" type="datetimeFigureOut">
               <a:rPr lang="en-US" dirty="0"/>
               <a:pPr/>
-              <a:t>9/20/2020</a:t>
+              <a:t>10/6/2020</a:t>
             </a:fld>
             <a:endParaRPr lang="en-US" dirty="0"/>
           </a:p>
@@ -2623,7 +2623,7 @@
           <a:p>
             <a:fld id="{55C6B4A9-1611-4792-9094-5F34BCA07E0B}" type="datetimeFigureOut">
               <a:rPr lang="en-US" dirty="0"/>
-              <a:t>9/20/2020</a:t>
+              <a:t>10/6/2020</a:t>
             </a:fld>
             <a:endParaRPr lang="en-US" dirty="0"/>
           </a:p>
@@ -2799,7 +2799,7 @@
             <a:fld id="{B61BEF0D-F0BB-DE4B-95CE-6DB70DBA9567}" type="datetimeFigureOut">
               <a:rPr lang="en-US" dirty="0"/>
               <a:pPr/>
-              <a:t>9/20/2020</a:t>
+              <a:t>10/6/2020</a:t>
             </a:fld>
             <a:endParaRPr lang="en-US" dirty="0"/>
           </a:p>
@@ -2965,7 +2965,7 @@
           <a:p>
             <a:fld id="{42A54C80-263E-416B-A8E0-580EDEADCBDC}" type="datetimeFigureOut">
               <a:rPr lang="en-US" dirty="0"/>
-              <a:t>9/20/2020</a:t>
+              <a:t>10/6/2020</a:t>
             </a:fld>
             <a:endParaRPr lang="en-US" dirty="0"/>
           </a:p>
@@ -3208,7 +3208,7 @@
             <a:fld id="{B61BEF0D-F0BB-DE4B-95CE-6DB70DBA9567}" type="datetimeFigureOut">
               <a:rPr lang="en-US" dirty="0"/>
               <a:pPr/>
-              <a:t>9/20/2020</a:t>
+              <a:t>10/6/2020</a:t>
             </a:fld>
             <a:endParaRPr lang="en-US" dirty="0"/>
           </a:p>
@@ -3436,7 +3436,7 @@
           <a:p>
             <a:fld id="{42A54C80-263E-416B-A8E0-580EDEADCBDC}" type="datetimeFigureOut">
               <a:rPr lang="en-US" dirty="0"/>
-              <a:t>9/20/2020</a:t>
+              <a:t>10/6/2020</a:t>
             </a:fld>
             <a:endParaRPr lang="en-US" dirty="0"/>
           </a:p>
@@ -3806,7 +3806,7 @@
             <a:fld id="{B61BEF0D-F0BB-DE4B-95CE-6DB70DBA9567}" type="datetimeFigureOut">
               <a:rPr lang="en-US" dirty="0"/>
               <a:pPr/>
-              <a:t>9/20/2020</a:t>
+              <a:t>10/6/2020</a:t>
             </a:fld>
             <a:endParaRPr lang="en-US" dirty="0"/>
           </a:p>
@@ -3926,7 +3926,7 @@
             <a:fld id="{B61BEF0D-F0BB-DE4B-95CE-6DB70DBA9567}" type="datetimeFigureOut">
               <a:rPr lang="en-US" dirty="0"/>
               <a:pPr/>
-              <a:t>9/20/2020</a:t>
+              <a:t>10/6/2020</a:t>
             </a:fld>
             <a:endParaRPr lang="en-US" dirty="0"/>
           </a:p>
@@ -4018,7 +4018,7 @@
             <a:fld id="{B61BEF0D-F0BB-DE4B-95CE-6DB70DBA9567}" type="datetimeFigureOut">
               <a:rPr lang="en-US" dirty="0"/>
               <a:pPr/>
-              <a:t>9/20/2020</a:t>
+              <a:t>10/6/2020</a:t>
             </a:fld>
             <a:endParaRPr lang="en-US" dirty="0"/>
           </a:p>
@@ -4269,7 +4269,7 @@
           <a:p>
             <a:fld id="{42A54C80-263E-416B-A8E0-580EDEADCBDC}" type="datetimeFigureOut">
               <a:rPr lang="en-US" dirty="0"/>
-              <a:t>9/20/2020</a:t>
+              <a:t>10/6/2020</a:t>
             </a:fld>
             <a:endParaRPr lang="en-US" dirty="0"/>
           </a:p>
@@ -4571,7 +4571,7 @@
             <a:fld id="{B61BEF0D-F0BB-DE4B-95CE-6DB70DBA9567}" type="datetimeFigureOut">
               <a:rPr lang="en-US" dirty="0"/>
               <a:pPr/>
-              <a:t>9/20/2020</a:t>
+              <a:t>10/6/2020</a:t>
             </a:fld>
             <a:endParaRPr lang="en-US" dirty="0"/>
           </a:p>
@@ -5269,7 +5269,7 @@
             <a:fld id="{B61BEF0D-F0BB-DE4B-95CE-6DB70DBA9567}" type="datetimeFigureOut">
               <a:rPr lang="en-US" dirty="0"/>
               <a:pPr/>
-              <a:t>9/20/2020</a:t>
+              <a:t>10/6/2020</a:t>
             </a:fld>
             <a:endParaRPr lang="en-US" dirty="0"/>
           </a:p>
@@ -5855,11 +5855,18 @@
   <p:clrMapOvr>
     <a:masterClrMapping/>
   </p:clrMapOvr>
+  <p:timing>
+    <p:tnLst>
+      <p:par>
+        <p:cTn id="1" dur="indefinite" restart="never" nodeType="tmRoot"/>
+      </p:par>
+    </p:tnLst>
+  </p:timing>
 </p:sld>
 </file>
 
 <file path=ppt/slides/slide10.xml><?xml version="1.0" encoding="utf-8"?>
-<p:sld xmlns:a="http://schemas.openxmlformats.org/drawingml/2006/main" xmlns:r="http://schemas.openxmlformats.org/officeDocument/2006/relationships" xmlns:p="http://schemas.openxmlformats.org/presentationml/2006/main">
+<p:sld xmlns:a="http://schemas.openxmlformats.org/drawingml/2006/main" xmlns:r="http://schemas.openxmlformats.org/officeDocument/2006/relationships" xmlns:p="http://schemas.openxmlformats.org/presentationml/2006/main" show="0">
   <p:cSld>
     <p:bg>
       <p:bgPr>
@@ -5976,6 +5983,14 @@
   <p:clrMapOvr>
     <a:masterClrMapping/>
   </p:clrMapOvr>
+  <mc:AlternateContent xmlns:mc="http://schemas.openxmlformats.org/markup-compatibility/2006">
+    <mc:Choice xmlns:p14="http://schemas.microsoft.com/office/powerpoint/2010/main" Requires="p14">
+      <p:transition spd="slow" p14:dur="2000"/>
+    </mc:Choice>
+    <mc:Fallback>
+      <p:transition spd="slow"/>
+    </mc:Fallback>
+  </mc:AlternateContent>
 </p:sld>
 </file>
 
@@ -6155,6 +6170,13 @@
   <p:clrMapOvr>
     <a:masterClrMapping/>
   </p:clrMapOvr>
+  <p:timing>
+    <p:tnLst>
+      <p:par>
+        <p:cTn id="1" dur="indefinite" restart="never" nodeType="tmRoot"/>
+      </p:par>
+    </p:tnLst>
+  </p:timing>
 </p:sld>
 </file>
 
@@ -6426,6 +6448,13 @@
   <p:clrMapOvr>
     <a:masterClrMapping/>
   </p:clrMapOvr>
+  <p:timing>
+    <p:tnLst>
+      <p:par>
+        <p:cTn id="1" dur="indefinite" restart="never" nodeType="tmRoot"/>
+      </p:par>
+    </p:tnLst>
+  </p:timing>
 </p:sld>
 </file>
 
@@ -6627,6 +6656,13 @@
   <p:clrMapOvr>
     <a:masterClrMapping/>
   </p:clrMapOvr>
+  <p:timing>
+    <p:tnLst>
+      <p:par>
+        <p:cTn id="1" dur="indefinite" restart="never" nodeType="tmRoot"/>
+      </p:par>
+    </p:tnLst>
+  </p:timing>
 </p:sld>
 </file>
 
@@ -6775,7 +6811,7 @@
           <a:blip r:embed="rId2">
             <a:extLst>
               <a:ext uri="{96DAC541-7B7A-43D3-8B79-37D633B846F1}">
-                <asvg:svgBlip xmlns:asvg="http://schemas.microsoft.com/office/drawing/2016/SVG/main" r:embed="rId3"/>
+                <asvg:svgBlip xmlns:asvg="http://schemas.microsoft.com/office/drawing/2016/SVG/main" xmlns="" r:embed="rId3"/>
               </a:ext>
             </a:extLst>
           </a:blip>
@@ -6803,6 +6839,13 @@
   <p:clrMapOvr>
     <a:masterClrMapping/>
   </p:clrMapOvr>
+  <p:timing>
+    <p:tnLst>
+      <p:par>
+        <p:cTn id="1" dur="indefinite" restart="never" nodeType="tmRoot"/>
+      </p:par>
+    </p:tnLst>
+  </p:timing>
 </p:sld>
 </file>
 
@@ -7052,6 +7095,13 @@
   <p:clrMapOvr>
     <a:masterClrMapping/>
   </p:clrMapOvr>
+  <p:timing>
+    <p:tnLst>
+      <p:par>
+        <p:cTn id="1" dur="indefinite" restart="never" nodeType="tmRoot"/>
+      </p:par>
+    </p:tnLst>
+  </p:timing>
 </p:sld>
 </file>
 
@@ -7343,6 +7393,13 @@
   <p:clrMapOvr>
     <a:masterClrMapping/>
   </p:clrMapOvr>
+  <p:timing>
+    <p:tnLst>
+      <p:par>
+        <p:cTn id="1" dur="indefinite" restart="never" nodeType="tmRoot"/>
+      </p:par>
+    </p:tnLst>
+  </p:timing>
 </p:sld>
 </file>
 
@@ -7529,6 +7586,13 @@
   <p:clrMapOvr>
     <a:masterClrMapping/>
   </p:clrMapOvr>
+  <p:timing>
+    <p:tnLst>
+      <p:par>
+        <p:cTn id="1" dur="indefinite" restart="never" nodeType="tmRoot"/>
+      </p:par>
+    </p:tnLst>
+  </p:timing>
 </p:sld>
 </file>
 
@@ -8366,6 +8430,13 @@
   <p:clrMapOvr>
     <a:masterClrMapping/>
   </p:clrMapOvr>
+  <p:timing>
+    <p:tnLst>
+      <p:par>
+        <p:cTn id="1" dur="indefinite" restart="never" nodeType="tmRoot"/>
+      </p:par>
+    </p:tnLst>
+  </p:timing>
 </p:sld>
 </file>
 

</xml_diff>